<commit_message>
Working on the poster
</commit_message>
<xml_diff>
--- a/M9_poster.pptx
+++ b/M9_poster.pptx
@@ -4,6 +4,12 @@
   <p:sldMasterIdLst>
     <p:sldMasterId id="2147483660" r:id="rId1"/>
   </p:sldMasterIdLst>
+  <p:notesMasterIdLst>
+    <p:notesMasterId r:id="rId3"/>
+  </p:notesMasterIdLst>
+  <p:handoutMasterIdLst>
+    <p:handoutMasterId r:id="rId4"/>
+  </p:handoutMasterIdLst>
   <p:sldIdLst>
     <p:sldId id="256" r:id="rId2"/>
   </p:sldIdLst>
@@ -104,7 +110,558 @@
       </a:defRPr>
     </a:lvl9pPr>
   </p:defaultTextStyle>
+  <p:extLst>
+    <p:ext uri="{EFAFB233-063F-42B5-8137-9DF3F51BA10A}">
+      <p15:sldGuideLst xmlns:p15="http://schemas.microsoft.com/office/powerpoint/2012/main">
+        <p15:guide id="1" pos="9535" userDrawn="1">
+          <p15:clr>
+            <a:srgbClr val="A4A3A4"/>
+          </p15:clr>
+        </p15:guide>
+      </p15:sldGuideLst>
+    </p:ext>
+  </p:extLst>
 </p:presentation>
+</file>
+
+<file path=ppt/handoutMasters/handoutMaster1.xml><?xml version="1.0" encoding="utf-8"?>
+<p:handoutMaster xmlns:a="http://schemas.openxmlformats.org/drawingml/2006/main" xmlns:r="http://schemas.openxmlformats.org/officeDocument/2006/relationships" xmlns:p="http://schemas.openxmlformats.org/presentationml/2006/main">
+  <p:cSld>
+    <p:bg>
+      <p:bgRef idx="1001">
+        <a:schemeClr val="bg1"/>
+      </p:bgRef>
+    </p:bg>
+    <p:spTree>
+      <p:nvGrpSpPr>
+        <p:cNvPr id="1" name=""/>
+        <p:cNvGrpSpPr/>
+        <p:nvPr/>
+      </p:nvGrpSpPr>
+      <p:grpSpPr>
+        <a:xfrm>
+          <a:off x="0" y="0"/>
+          <a:ext cx="0" cy="0"/>
+          <a:chOff x="0" y="0"/>
+          <a:chExt cx="0" cy="0"/>
+        </a:xfrm>
+      </p:grpSpPr>
+      <p:sp>
+        <p:nvSpPr>
+          <p:cNvPr id="2" name="Header Placeholder 1">
+            <a:extLst>
+              <a:ext uri="{FF2B5EF4-FFF2-40B4-BE49-F238E27FC236}">
+                <a16:creationId xmlns:a16="http://schemas.microsoft.com/office/drawing/2014/main" id="{1262CB9C-202F-4891-8A82-9EDA178DC313}"/>
+              </a:ext>
+            </a:extLst>
+          </p:cNvPr>
+          <p:cNvSpPr>
+            <a:spLocks noGrp="1"/>
+          </p:cNvSpPr>
+          <p:nvPr>
+            <p:ph type="hdr" sz="quarter"/>
+          </p:nvPr>
+        </p:nvSpPr>
+        <p:spPr>
+          <a:xfrm>
+            <a:off x="0" y="0"/>
+            <a:ext cx="2971800" cy="458788"/>
+          </a:xfrm>
+          <a:prstGeom prst="rect">
+            <a:avLst/>
+          </a:prstGeom>
+        </p:spPr>
+        <p:txBody>
+          <a:bodyPr vert="horz" lIns="91440" tIns="45720" rIns="91440" bIns="45720" rtlCol="0"/>
+          <a:lstStyle>
+            <a:lvl1pPr algn="l">
+              <a:defRPr sz="1200"/>
+            </a:lvl1pPr>
+          </a:lstStyle>
+          <a:p>
+            <a:endParaRPr lang="en-US"/>
+          </a:p>
+        </p:txBody>
+      </p:sp>
+      <p:sp>
+        <p:nvSpPr>
+          <p:cNvPr id="3" name="Date Placeholder 2">
+            <a:extLst>
+              <a:ext uri="{FF2B5EF4-FFF2-40B4-BE49-F238E27FC236}">
+                <a16:creationId xmlns:a16="http://schemas.microsoft.com/office/drawing/2014/main" id="{B06C4076-D71F-487B-B8A0-550717365403}"/>
+              </a:ext>
+            </a:extLst>
+          </p:cNvPr>
+          <p:cNvSpPr>
+            <a:spLocks noGrp="1"/>
+          </p:cNvSpPr>
+          <p:nvPr>
+            <p:ph type="dt" sz="quarter" idx="1"/>
+          </p:nvPr>
+        </p:nvSpPr>
+        <p:spPr>
+          <a:xfrm>
+            <a:off x="3884613" y="0"/>
+            <a:ext cx="2971800" cy="458788"/>
+          </a:xfrm>
+          <a:prstGeom prst="rect">
+            <a:avLst/>
+          </a:prstGeom>
+        </p:spPr>
+        <p:txBody>
+          <a:bodyPr vert="horz" lIns="91440" tIns="45720" rIns="91440" bIns="45720" rtlCol="0"/>
+          <a:lstStyle>
+            <a:lvl1pPr algn="r">
+              <a:defRPr sz="1200"/>
+            </a:lvl1pPr>
+          </a:lstStyle>
+          <a:p>
+            <a:fld id="{A9C9B128-F4BE-4D7A-AFD9-2AB1AE347F72}" type="datetimeFigureOut">
+              <a:rPr lang="en-US" smtClean="0"/>
+              <a:t>12/16/2019</a:t>
+            </a:fld>
+            <a:endParaRPr lang="en-US"/>
+          </a:p>
+        </p:txBody>
+      </p:sp>
+      <p:sp>
+        <p:nvSpPr>
+          <p:cNvPr id="4" name="Footer Placeholder 3">
+            <a:extLst>
+              <a:ext uri="{FF2B5EF4-FFF2-40B4-BE49-F238E27FC236}">
+                <a16:creationId xmlns:a16="http://schemas.microsoft.com/office/drawing/2014/main" id="{5240365C-1681-4293-AE88-D661D6534B8E}"/>
+              </a:ext>
+            </a:extLst>
+          </p:cNvPr>
+          <p:cNvSpPr>
+            <a:spLocks noGrp="1"/>
+          </p:cNvSpPr>
+          <p:nvPr>
+            <p:ph type="ftr" sz="quarter" idx="2"/>
+          </p:nvPr>
+        </p:nvSpPr>
+        <p:spPr>
+          <a:xfrm>
+            <a:off x="0" y="8685213"/>
+            <a:ext cx="2971800" cy="458787"/>
+          </a:xfrm>
+          <a:prstGeom prst="rect">
+            <a:avLst/>
+          </a:prstGeom>
+        </p:spPr>
+        <p:txBody>
+          <a:bodyPr vert="horz" lIns="91440" tIns="45720" rIns="91440" bIns="45720" rtlCol="0" anchor="b"/>
+          <a:lstStyle>
+            <a:lvl1pPr algn="l">
+              <a:defRPr sz="1200"/>
+            </a:lvl1pPr>
+          </a:lstStyle>
+          <a:p>
+            <a:endParaRPr lang="en-US"/>
+          </a:p>
+        </p:txBody>
+      </p:sp>
+      <p:sp>
+        <p:nvSpPr>
+          <p:cNvPr id="5" name="Slide Number Placeholder 4">
+            <a:extLst>
+              <a:ext uri="{FF2B5EF4-FFF2-40B4-BE49-F238E27FC236}">
+                <a16:creationId xmlns:a16="http://schemas.microsoft.com/office/drawing/2014/main" id="{CA864648-43B9-4E64-939D-7D7D8D236DAF}"/>
+              </a:ext>
+            </a:extLst>
+          </p:cNvPr>
+          <p:cNvSpPr>
+            <a:spLocks noGrp="1"/>
+          </p:cNvSpPr>
+          <p:nvPr>
+            <p:ph type="sldNum" sz="quarter" idx="3"/>
+          </p:nvPr>
+        </p:nvSpPr>
+        <p:spPr>
+          <a:xfrm>
+            <a:off x="3884613" y="8685213"/>
+            <a:ext cx="2971800" cy="458787"/>
+          </a:xfrm>
+          <a:prstGeom prst="rect">
+            <a:avLst/>
+          </a:prstGeom>
+        </p:spPr>
+        <p:txBody>
+          <a:bodyPr vert="horz" lIns="91440" tIns="45720" rIns="91440" bIns="45720" rtlCol="0" anchor="b"/>
+          <a:lstStyle>
+            <a:lvl1pPr algn="r">
+              <a:defRPr sz="1200"/>
+            </a:lvl1pPr>
+          </a:lstStyle>
+          <a:p>
+            <a:fld id="{626FFD18-84B7-49A9-A449-9D65286B3840}" type="slidenum">
+              <a:rPr lang="en-US" smtClean="0"/>
+              <a:t>‹#›</a:t>
+            </a:fld>
+            <a:endParaRPr lang="en-US"/>
+          </a:p>
+        </p:txBody>
+      </p:sp>
+    </p:spTree>
+    <p:extLst>
+      <p:ext uri="{BB962C8B-B14F-4D97-AF65-F5344CB8AC3E}">
+        <p14:creationId xmlns:p14="http://schemas.microsoft.com/office/powerpoint/2010/main" val="2762572034"/>
+      </p:ext>
+    </p:extLst>
+  </p:cSld>
+  <p:clrMap bg1="lt1" tx1="dk1" bg2="lt2" tx2="dk2" accent1="accent1" accent2="accent2" accent3="accent3" accent4="accent4" accent5="accent5" accent6="accent6" hlink="hlink" folHlink="folHlink"/>
+  <p:hf sldNum="0" hdr="0" ftr="0" dt="0"/>
+</p:handoutMaster>
+</file>
+
+<file path=ppt/notesMasters/notesMaster1.xml><?xml version="1.0" encoding="utf-8"?>
+<p:notesMaster xmlns:a="http://schemas.openxmlformats.org/drawingml/2006/main" xmlns:r="http://schemas.openxmlformats.org/officeDocument/2006/relationships" xmlns:p="http://schemas.openxmlformats.org/presentationml/2006/main">
+  <p:cSld>
+    <p:bg>
+      <p:bgRef idx="1001">
+        <a:schemeClr val="bg1"/>
+      </p:bgRef>
+    </p:bg>
+    <p:spTree>
+      <p:nvGrpSpPr>
+        <p:cNvPr id="1" name=""/>
+        <p:cNvGrpSpPr/>
+        <p:nvPr/>
+      </p:nvGrpSpPr>
+      <p:grpSpPr>
+        <a:xfrm>
+          <a:off x="0" y="0"/>
+          <a:ext cx="0" cy="0"/>
+          <a:chOff x="0" y="0"/>
+          <a:chExt cx="0" cy="0"/>
+        </a:xfrm>
+      </p:grpSpPr>
+      <p:sp>
+        <p:nvSpPr>
+          <p:cNvPr id="2" name="Header Placeholder 1"/>
+          <p:cNvSpPr>
+            <a:spLocks noGrp="1"/>
+          </p:cNvSpPr>
+          <p:nvPr>
+            <p:ph type="hdr" sz="quarter"/>
+          </p:nvPr>
+        </p:nvSpPr>
+        <p:spPr>
+          <a:xfrm>
+            <a:off x="0" y="0"/>
+            <a:ext cx="2971800" cy="458788"/>
+          </a:xfrm>
+          <a:prstGeom prst="rect">
+            <a:avLst/>
+          </a:prstGeom>
+        </p:spPr>
+        <p:txBody>
+          <a:bodyPr vert="horz" lIns="91440" tIns="45720" rIns="91440" bIns="45720" rtlCol="0"/>
+          <a:lstStyle>
+            <a:lvl1pPr algn="l">
+              <a:defRPr sz="1200"/>
+            </a:lvl1pPr>
+          </a:lstStyle>
+          <a:p>
+            <a:endParaRPr lang="en-US"/>
+          </a:p>
+        </p:txBody>
+      </p:sp>
+      <p:sp>
+        <p:nvSpPr>
+          <p:cNvPr id="3" name="Date Placeholder 2"/>
+          <p:cNvSpPr>
+            <a:spLocks noGrp="1"/>
+          </p:cNvSpPr>
+          <p:nvPr>
+            <p:ph type="dt" idx="1"/>
+          </p:nvPr>
+        </p:nvSpPr>
+        <p:spPr>
+          <a:xfrm>
+            <a:off x="3884613" y="0"/>
+            <a:ext cx="2971800" cy="458788"/>
+          </a:xfrm>
+          <a:prstGeom prst="rect">
+            <a:avLst/>
+          </a:prstGeom>
+        </p:spPr>
+        <p:txBody>
+          <a:bodyPr vert="horz" lIns="91440" tIns="45720" rIns="91440" bIns="45720" rtlCol="0"/>
+          <a:lstStyle>
+            <a:lvl1pPr algn="r">
+              <a:defRPr sz="1200"/>
+            </a:lvl1pPr>
+          </a:lstStyle>
+          <a:p>
+            <a:fld id="{58D2F95E-5996-4C9B-BC24-BE08262D659D}" type="datetimeFigureOut">
+              <a:rPr lang="en-US" smtClean="0"/>
+              <a:t>12/16/2019</a:t>
+            </a:fld>
+            <a:endParaRPr lang="en-US"/>
+          </a:p>
+        </p:txBody>
+      </p:sp>
+      <p:sp>
+        <p:nvSpPr>
+          <p:cNvPr id="4" name="Slide Image Placeholder 3"/>
+          <p:cNvSpPr>
+            <a:spLocks noGrp="1" noRot="1" noChangeAspect="1"/>
+          </p:cNvSpPr>
+          <p:nvPr>
+            <p:ph type="sldImg" idx="2"/>
+          </p:nvPr>
+        </p:nvSpPr>
+        <p:spPr>
+          <a:xfrm>
+            <a:off x="2338388" y="1143000"/>
+            <a:ext cx="2181225" cy="3086100"/>
+          </a:xfrm>
+          <a:prstGeom prst="rect">
+            <a:avLst/>
+          </a:prstGeom>
+          <a:noFill/>
+          <a:ln w="12700">
+            <a:solidFill>
+              <a:prstClr val="black"/>
+            </a:solidFill>
+          </a:ln>
+        </p:spPr>
+        <p:txBody>
+          <a:bodyPr vert="horz" lIns="91440" tIns="45720" rIns="91440" bIns="45720" rtlCol="0" anchor="ctr"/>
+          <a:lstStyle/>
+          <a:p>
+            <a:endParaRPr lang="en-US"/>
+          </a:p>
+        </p:txBody>
+      </p:sp>
+      <p:sp>
+        <p:nvSpPr>
+          <p:cNvPr id="5" name="Notes Placeholder 4"/>
+          <p:cNvSpPr>
+            <a:spLocks noGrp="1"/>
+          </p:cNvSpPr>
+          <p:nvPr>
+            <p:ph type="body" sz="quarter" idx="3"/>
+          </p:nvPr>
+        </p:nvSpPr>
+        <p:spPr>
+          <a:xfrm>
+            <a:off x="685800" y="4400550"/>
+            <a:ext cx="5486400" cy="3600450"/>
+          </a:xfrm>
+          <a:prstGeom prst="rect">
+            <a:avLst/>
+          </a:prstGeom>
+        </p:spPr>
+        <p:txBody>
+          <a:bodyPr vert="horz" lIns="91440" tIns="45720" rIns="91440" bIns="45720" rtlCol="0"/>
+          <a:lstStyle/>
+          <a:p>
+            <a:pPr lvl="0"/>
+            <a:r>
+              <a:rPr lang="en-US"/>
+              <a:t>Click to edit Master text styles</a:t>
+            </a:r>
+          </a:p>
+          <a:p>
+            <a:pPr lvl="1"/>
+            <a:r>
+              <a:rPr lang="en-US"/>
+              <a:t>Second level</a:t>
+            </a:r>
+          </a:p>
+          <a:p>
+            <a:pPr lvl="2"/>
+            <a:r>
+              <a:rPr lang="en-US"/>
+              <a:t>Third level</a:t>
+            </a:r>
+          </a:p>
+          <a:p>
+            <a:pPr lvl="3"/>
+            <a:r>
+              <a:rPr lang="en-US"/>
+              <a:t>Fourth level</a:t>
+            </a:r>
+          </a:p>
+          <a:p>
+            <a:pPr lvl="4"/>
+            <a:r>
+              <a:rPr lang="en-US"/>
+              <a:t>Fifth level</a:t>
+            </a:r>
+          </a:p>
+        </p:txBody>
+      </p:sp>
+      <p:sp>
+        <p:nvSpPr>
+          <p:cNvPr id="6" name="Footer Placeholder 5"/>
+          <p:cNvSpPr>
+            <a:spLocks noGrp="1"/>
+          </p:cNvSpPr>
+          <p:nvPr>
+            <p:ph type="ftr" sz="quarter" idx="4"/>
+          </p:nvPr>
+        </p:nvSpPr>
+        <p:spPr>
+          <a:xfrm>
+            <a:off x="0" y="8685213"/>
+            <a:ext cx="2971800" cy="458787"/>
+          </a:xfrm>
+          <a:prstGeom prst="rect">
+            <a:avLst/>
+          </a:prstGeom>
+        </p:spPr>
+        <p:txBody>
+          <a:bodyPr vert="horz" lIns="91440" tIns="45720" rIns="91440" bIns="45720" rtlCol="0" anchor="b"/>
+          <a:lstStyle>
+            <a:lvl1pPr algn="l">
+              <a:defRPr sz="1200"/>
+            </a:lvl1pPr>
+          </a:lstStyle>
+          <a:p>
+            <a:endParaRPr lang="en-US"/>
+          </a:p>
+        </p:txBody>
+      </p:sp>
+      <p:sp>
+        <p:nvSpPr>
+          <p:cNvPr id="7" name="Slide Number Placeholder 6"/>
+          <p:cNvSpPr>
+            <a:spLocks noGrp="1"/>
+          </p:cNvSpPr>
+          <p:nvPr>
+            <p:ph type="sldNum" sz="quarter" idx="5"/>
+          </p:nvPr>
+        </p:nvSpPr>
+        <p:spPr>
+          <a:xfrm>
+            <a:off x="3884613" y="8685213"/>
+            <a:ext cx="2971800" cy="458787"/>
+          </a:xfrm>
+          <a:prstGeom prst="rect">
+            <a:avLst/>
+          </a:prstGeom>
+        </p:spPr>
+        <p:txBody>
+          <a:bodyPr vert="horz" lIns="91440" tIns="45720" rIns="91440" bIns="45720" rtlCol="0" anchor="b"/>
+          <a:lstStyle>
+            <a:lvl1pPr algn="r">
+              <a:defRPr sz="1200"/>
+            </a:lvl1pPr>
+          </a:lstStyle>
+          <a:p>
+            <a:fld id="{5D851ABD-A63A-4CE4-8FCD-338DD56D88D6}" type="slidenum">
+              <a:rPr lang="en-US" smtClean="0"/>
+              <a:t>‹#›</a:t>
+            </a:fld>
+            <a:endParaRPr lang="en-US"/>
+          </a:p>
+        </p:txBody>
+      </p:sp>
+    </p:spTree>
+    <p:extLst>
+      <p:ext uri="{BB962C8B-B14F-4D97-AF65-F5344CB8AC3E}">
+        <p14:creationId xmlns:p14="http://schemas.microsoft.com/office/powerpoint/2010/main" val="1322553137"/>
+      </p:ext>
+    </p:extLst>
+  </p:cSld>
+  <p:clrMap bg1="lt1" tx1="dk1" bg2="lt2" tx2="dk2" accent1="accent1" accent2="accent2" accent3="accent3" accent4="accent4" accent5="accent5" accent6="accent6" hlink="hlink" folHlink="folHlink"/>
+  <p:hf sldNum="0" hdr="0" ftr="0" dt="0"/>
+  <p:notesStyle>
+    <a:lvl1pPr marL="0" algn="l" defTabSz="914400" rtl="0" eaLnBrk="1" latinLnBrk="0" hangingPunct="1">
+      <a:defRPr sz="1200" kern="1200">
+        <a:solidFill>
+          <a:schemeClr val="tx1"/>
+        </a:solidFill>
+        <a:latin typeface="+mn-lt"/>
+        <a:ea typeface="+mn-ea"/>
+        <a:cs typeface="+mn-cs"/>
+      </a:defRPr>
+    </a:lvl1pPr>
+    <a:lvl2pPr marL="457200" algn="l" defTabSz="914400" rtl="0" eaLnBrk="1" latinLnBrk="0" hangingPunct="1">
+      <a:defRPr sz="1200" kern="1200">
+        <a:solidFill>
+          <a:schemeClr val="tx1"/>
+        </a:solidFill>
+        <a:latin typeface="+mn-lt"/>
+        <a:ea typeface="+mn-ea"/>
+        <a:cs typeface="+mn-cs"/>
+      </a:defRPr>
+    </a:lvl2pPr>
+    <a:lvl3pPr marL="914400" algn="l" defTabSz="914400" rtl="0" eaLnBrk="1" latinLnBrk="0" hangingPunct="1">
+      <a:defRPr sz="1200" kern="1200">
+        <a:solidFill>
+          <a:schemeClr val="tx1"/>
+        </a:solidFill>
+        <a:latin typeface="+mn-lt"/>
+        <a:ea typeface="+mn-ea"/>
+        <a:cs typeface="+mn-cs"/>
+      </a:defRPr>
+    </a:lvl3pPr>
+    <a:lvl4pPr marL="1371600" algn="l" defTabSz="914400" rtl="0" eaLnBrk="1" latinLnBrk="0" hangingPunct="1">
+      <a:defRPr sz="1200" kern="1200">
+        <a:solidFill>
+          <a:schemeClr val="tx1"/>
+        </a:solidFill>
+        <a:latin typeface="+mn-lt"/>
+        <a:ea typeface="+mn-ea"/>
+        <a:cs typeface="+mn-cs"/>
+      </a:defRPr>
+    </a:lvl4pPr>
+    <a:lvl5pPr marL="1828800" algn="l" defTabSz="914400" rtl="0" eaLnBrk="1" latinLnBrk="0" hangingPunct="1">
+      <a:defRPr sz="1200" kern="1200">
+        <a:solidFill>
+          <a:schemeClr val="tx1"/>
+        </a:solidFill>
+        <a:latin typeface="+mn-lt"/>
+        <a:ea typeface="+mn-ea"/>
+        <a:cs typeface="+mn-cs"/>
+      </a:defRPr>
+    </a:lvl5pPr>
+    <a:lvl6pPr marL="2286000" algn="l" defTabSz="914400" rtl="0" eaLnBrk="1" latinLnBrk="0" hangingPunct="1">
+      <a:defRPr sz="1200" kern="1200">
+        <a:solidFill>
+          <a:schemeClr val="tx1"/>
+        </a:solidFill>
+        <a:latin typeface="+mn-lt"/>
+        <a:ea typeface="+mn-ea"/>
+        <a:cs typeface="+mn-cs"/>
+      </a:defRPr>
+    </a:lvl6pPr>
+    <a:lvl7pPr marL="2743200" algn="l" defTabSz="914400" rtl="0" eaLnBrk="1" latinLnBrk="0" hangingPunct="1">
+      <a:defRPr sz="1200" kern="1200">
+        <a:solidFill>
+          <a:schemeClr val="tx1"/>
+        </a:solidFill>
+        <a:latin typeface="+mn-lt"/>
+        <a:ea typeface="+mn-ea"/>
+        <a:cs typeface="+mn-cs"/>
+      </a:defRPr>
+    </a:lvl7pPr>
+    <a:lvl8pPr marL="3200400" algn="l" defTabSz="914400" rtl="0" eaLnBrk="1" latinLnBrk="0" hangingPunct="1">
+      <a:defRPr sz="1200" kern="1200">
+        <a:solidFill>
+          <a:schemeClr val="tx1"/>
+        </a:solidFill>
+        <a:latin typeface="+mn-lt"/>
+        <a:ea typeface="+mn-ea"/>
+        <a:cs typeface="+mn-cs"/>
+      </a:defRPr>
+    </a:lvl8pPr>
+    <a:lvl9pPr marL="3657600" algn="l" defTabSz="914400" rtl="0" eaLnBrk="1" latinLnBrk="0" hangingPunct="1">
+      <a:defRPr sz="1200" kern="1200">
+        <a:solidFill>
+          <a:schemeClr val="tx1"/>
+        </a:solidFill>
+        <a:latin typeface="+mn-lt"/>
+        <a:ea typeface="+mn-ea"/>
+        <a:cs typeface="+mn-cs"/>
+      </a:defRPr>
+    </a:lvl9pPr>
+  </p:notesStyle>
+</p:notesMaster>
 </file>
 
 <file path=ppt/slideLayouts/slideLayout1.xml><?xml version="1.0" encoding="utf-8"?>
@@ -238,7 +795,7 @@
           <a:p>
             <a:fld id="{89466727-8F6B-4EB6-8EFC-909E476A2B66}" type="datetimeFigureOut">
               <a:rPr lang="en-US" smtClean="0"/>
-              <a:t>12/15/2019</a:t>
+              <a:t>12/16/2019</a:t>
             </a:fld>
             <a:endParaRPr lang="en-US"/>
           </a:p>
@@ -408,7 +965,7 @@
           <a:p>
             <a:fld id="{89466727-8F6B-4EB6-8EFC-909E476A2B66}" type="datetimeFigureOut">
               <a:rPr lang="en-US" smtClean="0"/>
-              <a:t>12/15/2019</a:t>
+              <a:t>12/16/2019</a:t>
             </a:fld>
             <a:endParaRPr lang="en-US"/>
           </a:p>
@@ -588,7 +1145,7 @@
           <a:p>
             <a:fld id="{89466727-8F6B-4EB6-8EFC-909E476A2B66}" type="datetimeFigureOut">
               <a:rPr lang="en-US" smtClean="0"/>
-              <a:t>12/15/2019</a:t>
+              <a:t>12/16/2019</a:t>
             </a:fld>
             <a:endParaRPr lang="en-US"/>
           </a:p>
@@ -758,7 +1315,7 @@
           <a:p>
             <a:fld id="{89466727-8F6B-4EB6-8EFC-909E476A2B66}" type="datetimeFigureOut">
               <a:rPr lang="en-US" smtClean="0"/>
-              <a:t>12/15/2019</a:t>
+              <a:t>12/16/2019</a:t>
             </a:fld>
             <a:endParaRPr lang="en-US"/>
           </a:p>
@@ -1002,7 +1559,7 @@
           <a:p>
             <a:fld id="{89466727-8F6B-4EB6-8EFC-909E476A2B66}" type="datetimeFigureOut">
               <a:rPr lang="en-US" smtClean="0"/>
-              <a:t>12/15/2019</a:t>
+              <a:t>12/16/2019</a:t>
             </a:fld>
             <a:endParaRPr lang="en-US"/>
           </a:p>
@@ -1234,7 +1791,7 @@
           <a:p>
             <a:fld id="{89466727-8F6B-4EB6-8EFC-909E476A2B66}" type="datetimeFigureOut">
               <a:rPr lang="en-US" smtClean="0"/>
-              <a:t>12/15/2019</a:t>
+              <a:t>12/16/2019</a:t>
             </a:fld>
             <a:endParaRPr lang="en-US"/>
           </a:p>
@@ -1601,7 +2158,7 @@
           <a:p>
             <a:fld id="{89466727-8F6B-4EB6-8EFC-909E476A2B66}" type="datetimeFigureOut">
               <a:rPr lang="en-US" smtClean="0"/>
-              <a:t>12/15/2019</a:t>
+              <a:t>12/16/2019</a:t>
             </a:fld>
             <a:endParaRPr lang="en-US"/>
           </a:p>
@@ -1719,7 +2276,7 @@
           <a:p>
             <a:fld id="{89466727-8F6B-4EB6-8EFC-909E476A2B66}" type="datetimeFigureOut">
               <a:rPr lang="en-US" smtClean="0"/>
-              <a:t>12/15/2019</a:t>
+              <a:t>12/16/2019</a:t>
             </a:fld>
             <a:endParaRPr lang="en-US"/>
           </a:p>
@@ -1814,7 +2371,7 @@
           <a:p>
             <a:fld id="{89466727-8F6B-4EB6-8EFC-909E476A2B66}" type="datetimeFigureOut">
               <a:rPr lang="en-US" smtClean="0"/>
-              <a:t>12/15/2019</a:t>
+              <a:t>12/16/2019</a:t>
             </a:fld>
             <a:endParaRPr lang="en-US"/>
           </a:p>
@@ -2091,7 +2648,7 @@
           <a:p>
             <a:fld id="{89466727-8F6B-4EB6-8EFC-909E476A2B66}" type="datetimeFigureOut">
               <a:rPr lang="en-US" smtClean="0"/>
-              <a:t>12/15/2019</a:t>
+              <a:t>12/16/2019</a:t>
             </a:fld>
             <a:endParaRPr lang="en-US"/>
           </a:p>
@@ -2348,7 +2905,7 @@
           <a:p>
             <a:fld id="{89466727-8F6B-4EB6-8EFC-909E476A2B66}" type="datetimeFigureOut">
               <a:rPr lang="en-US" smtClean="0"/>
-              <a:t>12/15/2019</a:t>
+              <a:t>12/16/2019</a:t>
             </a:fld>
             <a:endParaRPr lang="en-US"/>
           </a:p>
@@ -2561,7 +3118,7 @@
           <a:p>
             <a:fld id="{89466727-8F6B-4EB6-8EFC-909E476A2B66}" type="datetimeFigureOut">
               <a:rPr lang="en-US" smtClean="0"/>
-              <a:t>12/15/2019</a:t>
+              <a:t>12/16/2019</a:t>
             </a:fld>
             <a:endParaRPr lang="en-US"/>
           </a:p>
@@ -2999,9 +3556,16 @@
           </a:bodyPr>
           <a:lstStyle/>
           <a:p>
-            <a:pPr algn="ctr"/>
-            <a:r>
-              <a:rPr lang="en-US" sz="8500" b="1" dirty="0">
+            <a:r>
+              <a:rPr lang="et-EE" sz="9600" b="1" dirty="0">
+                <a:solidFill>
+                  <a:schemeClr val="bg1"/>
+                </a:solidFill>
+              </a:rPr>
+              <a:t>   </a:t>
+            </a:r>
+            <a:r>
+              <a:rPr lang="en-US" sz="9600" b="1" dirty="0">
                 <a:solidFill>
                   <a:schemeClr val="bg1"/>
                 </a:solidFill>
@@ -3029,27 +3593,30 @@
         </p:nvSpPr>
         <p:spPr>
           <a:xfrm>
-            <a:off x="2081421" y="6160168"/>
-            <a:ext cx="12866966" cy="32392946"/>
+            <a:off x="1155032" y="6160168"/>
+            <a:ext cx="13982573" cy="4250649"/>
           </a:xfrm>
         </p:spPr>
         <p:txBody>
           <a:bodyPr>
-            <a:normAutofit/>
+            <a:normAutofit fontScale="25000" lnSpcReduction="20000"/>
           </a:bodyPr>
           <a:lstStyle/>
           <a:p>
             <a:r>
-              <a:rPr lang="en-US" sz="3600" dirty="0"/>
+              <a:rPr lang="en-US" sz="28800" dirty="0"/>
               <a:t>Introduction</a:t>
             </a:r>
           </a:p>
           <a:p>
-            <a:r>
-              <a:rPr lang="en-US" sz="2400" dirty="0"/>
+            <a:pPr marL="0" indent="0">
+              <a:buNone/>
+            </a:pPr>
+            <a:r>
+              <a:rPr lang="en-US" sz="16000" dirty="0"/>
               <a:t>An exoplanet is defined as a planet which orbits a star outside our own solar system. Exoplanets are a field of research for astronomers and astrophysicists to gather more data on different planetary systems and make better theories on system formation and evolution. Also of great interest is the possibility of extraterrestrial life existing. Studying exoplanets could help answer the age-old question: are we alone in the universe?</a:t>
             </a:r>
-            <a:endParaRPr lang="et-EE" sz="2400" dirty="0"/>
+            <a:endParaRPr lang="et-EE" sz="16000" dirty="0"/>
           </a:p>
           <a:p>
             <a:endParaRPr lang="en-US" sz="4400" dirty="0"/>
@@ -3065,38 +3632,41 @@
           </a:p>
         </p:txBody>
       </p:sp>
-      <p:sp>
-        <p:nvSpPr>
-          <p:cNvPr id="7" name="Content Placeholder 6">
+      <p:pic>
+        <p:nvPicPr>
+          <p:cNvPr id="3" name="Content Placeholder 2" descr="A picture containing drawing&#10;&#10;Description automatically generated">
             <a:extLst>
               <a:ext uri="{FF2B5EF4-FFF2-40B4-BE49-F238E27FC236}">
-                <a16:creationId xmlns:a16="http://schemas.microsoft.com/office/drawing/2014/main" id="{1615B387-EA22-44FE-9EFF-8787F24DABC0}"/>
+                <a16:creationId xmlns:a16="http://schemas.microsoft.com/office/drawing/2014/main" id="{C5A8223D-977A-40F1-8574-A54BFBB55F36}"/>
               </a:ext>
             </a:extLst>
           </p:cNvPr>
-          <p:cNvSpPr>
-            <a:spLocks noGrp="1"/>
-          </p:cNvSpPr>
+          <p:cNvPicPr>
+            <a:picLocks noGrp="1" noChangeAspect="1"/>
+          </p:cNvPicPr>
           <p:nvPr>
             <p:ph sz="half" idx="2"/>
           </p:nvPr>
-        </p:nvSpPr>
+        </p:nvPicPr>
+        <p:blipFill>
+          <a:blip r:embed="rId2">
+            <a:extLst>
+              <a:ext uri="{28A0092B-C50C-407E-A947-70E740481C1C}">
+                <a14:useLocalDpi xmlns:a14="http://schemas.microsoft.com/office/drawing/2010/main" val="0"/>
+              </a:ext>
+            </a:extLst>
+          </a:blip>
+          <a:stretch>
+            <a:fillRect/>
+          </a:stretch>
+        </p:blipFill>
         <p:spPr>
           <a:xfrm>
-            <a:off x="15326826" y="6160168"/>
-            <a:ext cx="12866966" cy="32392946"/>
+            <a:off x="22136406" y="878078"/>
+            <a:ext cx="8523817" cy="2884887"/>
           </a:xfrm>
         </p:spPr>
-        <p:txBody>
-          <a:bodyPr>
-            <a:normAutofit/>
-          </a:bodyPr>
-          <a:lstStyle/>
-          <a:p>
-            <a:endParaRPr lang="en-US" dirty="0"/>
-          </a:p>
-        </p:txBody>
-      </p:sp>
+      </p:pic>
       <p:sp>
         <p:nvSpPr>
           <p:cNvPr id="8" name="Rectangle 7">
@@ -3111,7 +3681,7 @@
         </p:nvSpPr>
         <p:spPr>
           <a:xfrm>
-            <a:off x="5378176" y="2888783"/>
+            <a:off x="-2835981" y="2747302"/>
             <a:ext cx="19140422" cy="1015663"/>
           </a:xfrm>
           <a:prstGeom prst="rect">
@@ -3126,7 +3696,7 @@
           <a:p>
             <a:pPr algn="ctr"/>
             <a:r>
-              <a:rPr lang="et-EE" sz="5600" dirty="0" err="1">
+              <a:rPr lang="et-EE" sz="6000" dirty="0" err="1">
                 <a:solidFill>
                   <a:schemeClr val="bg1"/>
                 </a:solidFill>
@@ -3149,6 +3719,277 @@
           </a:p>
         </p:txBody>
       </p:sp>
+      <p:sp>
+        <p:nvSpPr>
+          <p:cNvPr id="12" name="Footer Placeholder 11">
+            <a:extLst>
+              <a:ext uri="{FF2B5EF4-FFF2-40B4-BE49-F238E27FC236}">
+                <a16:creationId xmlns:a16="http://schemas.microsoft.com/office/drawing/2014/main" id="{E5399548-9121-42C8-89BC-9DF99F870995}"/>
+              </a:ext>
+            </a:extLst>
+          </p:cNvPr>
+          <p:cNvSpPr>
+            <a:spLocks noGrp="1"/>
+          </p:cNvSpPr>
+          <p:nvPr>
+            <p:ph type="ftr" sz="quarter" idx="11"/>
+          </p:nvPr>
+        </p:nvSpPr>
+        <p:spPr>
+          <a:xfrm>
+            <a:off x="0" y="40907368"/>
+            <a:ext cx="30275213" cy="1896394"/>
+          </a:xfrm>
+          <a:solidFill>
+            <a:schemeClr val="accent1">
+              <a:lumMod val="75000"/>
+            </a:schemeClr>
+          </a:solidFill>
+        </p:spPr>
+        <p:txBody>
+          <a:bodyPr/>
+          <a:lstStyle/>
+          <a:p>
+            <a:endParaRPr lang="en-US" dirty="0"/>
+          </a:p>
+        </p:txBody>
+      </p:sp>
+      <p:sp>
+        <p:nvSpPr>
+          <p:cNvPr id="13" name="TextBox 12">
+            <a:extLst>
+              <a:ext uri="{FF2B5EF4-FFF2-40B4-BE49-F238E27FC236}">
+                <a16:creationId xmlns:a16="http://schemas.microsoft.com/office/drawing/2014/main" id="{2F3B50F1-DCE9-471E-86CF-36DA7D726D1E}"/>
+              </a:ext>
+            </a:extLst>
+          </p:cNvPr>
+          <p:cNvSpPr txBox="1"/>
+          <p:nvPr/>
+        </p:nvSpPr>
+        <p:spPr>
+          <a:xfrm>
+            <a:off x="1203158" y="12320336"/>
+            <a:ext cx="13982573" cy="1200329"/>
+          </a:xfrm>
+          <a:prstGeom prst="rect">
+            <a:avLst/>
+          </a:prstGeom>
+          <a:noFill/>
+        </p:spPr>
+        <p:txBody>
+          <a:bodyPr wrap="square" rtlCol="0">
+            <a:spAutoFit/>
+          </a:bodyPr>
+          <a:lstStyle/>
+          <a:p>
+            <a:pPr marL="857250" indent="-857250">
+              <a:buFont typeface="Arial" panose="020B0604020202020204" pitchFamily="34" charset="0"/>
+              <a:buChar char="•"/>
+            </a:pPr>
+            <a:r>
+              <a:rPr lang="et-EE" sz="7200" dirty="0" err="1"/>
+              <a:t>Data</a:t>
+            </a:r>
+            <a:endParaRPr lang="et-EE" sz="7200" dirty="0"/>
+          </a:p>
+        </p:txBody>
+      </p:sp>
+      <p:sp>
+        <p:nvSpPr>
+          <p:cNvPr id="14" name="TextBox 13">
+            <a:extLst>
+              <a:ext uri="{FF2B5EF4-FFF2-40B4-BE49-F238E27FC236}">
+                <a16:creationId xmlns:a16="http://schemas.microsoft.com/office/drawing/2014/main" id="{2FD12A76-FC7D-4965-B76E-A016F6773A54}"/>
+              </a:ext>
+            </a:extLst>
+          </p:cNvPr>
+          <p:cNvSpPr txBox="1"/>
+          <p:nvPr/>
+        </p:nvSpPr>
+        <p:spPr>
+          <a:xfrm>
+            <a:off x="1203157" y="20801716"/>
+            <a:ext cx="13982573" cy="1200329"/>
+          </a:xfrm>
+          <a:prstGeom prst="rect">
+            <a:avLst/>
+          </a:prstGeom>
+          <a:noFill/>
+        </p:spPr>
+        <p:txBody>
+          <a:bodyPr wrap="square" rtlCol="0">
+            <a:spAutoFit/>
+          </a:bodyPr>
+          <a:lstStyle/>
+          <a:p>
+            <a:pPr marL="857250" indent="-857250">
+              <a:buFont typeface="Arial" panose="020B0604020202020204" pitchFamily="34" charset="0"/>
+              <a:buChar char="•"/>
+            </a:pPr>
+            <a:r>
+              <a:rPr lang="et-EE" sz="7200" dirty="0" err="1"/>
+              <a:t>Processing</a:t>
+            </a:r>
+            <a:endParaRPr lang="en-US" sz="7200" dirty="0"/>
+          </a:p>
+        </p:txBody>
+      </p:sp>
+      <p:sp>
+        <p:nvSpPr>
+          <p:cNvPr id="15" name="TextBox 14">
+            <a:extLst>
+              <a:ext uri="{FF2B5EF4-FFF2-40B4-BE49-F238E27FC236}">
+                <a16:creationId xmlns:a16="http://schemas.microsoft.com/office/drawing/2014/main" id="{39B8BD6C-EBD3-4BF7-9B9B-883E260F3C54}"/>
+              </a:ext>
+            </a:extLst>
+          </p:cNvPr>
+          <p:cNvSpPr txBox="1"/>
+          <p:nvPr/>
+        </p:nvSpPr>
+        <p:spPr>
+          <a:xfrm>
+            <a:off x="15185731" y="6160168"/>
+            <a:ext cx="13934450" cy="1200329"/>
+          </a:xfrm>
+          <a:prstGeom prst="rect">
+            <a:avLst/>
+          </a:prstGeom>
+          <a:noFill/>
+        </p:spPr>
+        <p:txBody>
+          <a:bodyPr wrap="square" rtlCol="0">
+            <a:spAutoFit/>
+          </a:bodyPr>
+          <a:lstStyle/>
+          <a:p>
+            <a:pPr marL="857250" indent="-857250">
+              <a:buFont typeface="Arial" panose="020B0604020202020204" pitchFamily="34" charset="0"/>
+              <a:buChar char="•"/>
+            </a:pPr>
+            <a:r>
+              <a:rPr lang="et-EE" sz="7200" dirty="0"/>
+              <a:t>Building </a:t>
+            </a:r>
+            <a:r>
+              <a:rPr lang="et-EE" sz="7200" dirty="0" err="1"/>
+              <a:t>models</a:t>
+            </a:r>
+            <a:endParaRPr lang="en-US" sz="7200" dirty="0"/>
+          </a:p>
+        </p:txBody>
+      </p:sp>
+      <p:sp>
+        <p:nvSpPr>
+          <p:cNvPr id="16" name="TextBox 15">
+            <a:extLst>
+              <a:ext uri="{FF2B5EF4-FFF2-40B4-BE49-F238E27FC236}">
+                <a16:creationId xmlns:a16="http://schemas.microsoft.com/office/drawing/2014/main" id="{EA9EA575-D771-42FA-A9F8-6BD49281464F}"/>
+              </a:ext>
+            </a:extLst>
+          </p:cNvPr>
+          <p:cNvSpPr txBox="1"/>
+          <p:nvPr/>
+        </p:nvSpPr>
+        <p:spPr>
+          <a:xfrm>
+            <a:off x="15136812" y="9267459"/>
+            <a:ext cx="13934449" cy="923330"/>
+          </a:xfrm>
+          <a:prstGeom prst="rect">
+            <a:avLst/>
+          </a:prstGeom>
+          <a:noFill/>
+        </p:spPr>
+        <p:txBody>
+          <a:bodyPr wrap="square" rtlCol="0">
+            <a:spAutoFit/>
+          </a:bodyPr>
+          <a:lstStyle/>
+          <a:p>
+            <a:pPr marL="285750" indent="-285750">
+              <a:buFont typeface="Arial" panose="020B0604020202020204" pitchFamily="34" charset="0"/>
+              <a:buChar char="•"/>
+            </a:pPr>
+            <a:r>
+              <a:rPr lang="et-EE" sz="5400" dirty="0" err="1"/>
+              <a:t>Conclusions</a:t>
+            </a:r>
+            <a:endParaRPr lang="en-US" sz="5400" dirty="0"/>
+          </a:p>
+        </p:txBody>
+      </p:sp>
+      <p:pic>
+        <p:nvPicPr>
+          <p:cNvPr id="31" name="Picture 30" descr="A close up of a logo&#10;&#10;Description automatically generated">
+            <a:extLst>
+              <a:ext uri="{FF2B5EF4-FFF2-40B4-BE49-F238E27FC236}">
+                <a16:creationId xmlns:a16="http://schemas.microsoft.com/office/drawing/2014/main" id="{C5CC70D8-7795-42AD-8AD0-667F42A0F2C7}"/>
+              </a:ext>
+            </a:extLst>
+          </p:cNvPr>
+          <p:cNvPicPr>
+            <a:picLocks noChangeAspect="1"/>
+          </p:cNvPicPr>
+          <p:nvPr/>
+        </p:nvPicPr>
+        <p:blipFill>
+          <a:blip r:embed="rId3">
+            <a:extLst>
+              <a:ext uri="{28A0092B-C50C-407E-A947-70E740481C1C}">
+                <a14:useLocalDpi xmlns:a14="http://schemas.microsoft.com/office/drawing/2010/main" val="0"/>
+              </a:ext>
+            </a:extLst>
+          </a:blip>
+          <a:stretch>
+            <a:fillRect/>
+          </a:stretch>
+        </p:blipFill>
+        <p:spPr>
+          <a:xfrm>
+            <a:off x="15196842" y="11181662"/>
+            <a:ext cx="14630429" cy="9144018"/>
+          </a:xfrm>
+          <a:prstGeom prst="rect">
+            <a:avLst/>
+          </a:prstGeom>
+        </p:spPr>
+      </p:pic>
+      <p:pic>
+        <p:nvPicPr>
+          <p:cNvPr id="33" name="Picture 32" descr="A close up of a map&#10;&#10;Description automatically generated">
+            <a:extLst>
+              <a:ext uri="{FF2B5EF4-FFF2-40B4-BE49-F238E27FC236}">
+                <a16:creationId xmlns:a16="http://schemas.microsoft.com/office/drawing/2014/main" id="{E36E9A77-4CF4-45B4-B95D-7DC189AF8B3C}"/>
+              </a:ext>
+            </a:extLst>
+          </p:cNvPr>
+          <p:cNvPicPr>
+            <a:picLocks noChangeAspect="1"/>
+          </p:cNvPicPr>
+          <p:nvPr/>
+        </p:nvPicPr>
+        <p:blipFill>
+          <a:blip r:embed="rId4">
+            <a:extLst>
+              <a:ext uri="{28A0092B-C50C-407E-A947-70E740481C1C}">
+                <a14:useLocalDpi xmlns:a14="http://schemas.microsoft.com/office/drawing/2010/main" val="0"/>
+              </a:ext>
+            </a:extLst>
+          </a:blip>
+          <a:stretch>
+            <a:fillRect/>
+          </a:stretch>
+        </p:blipFill>
+        <p:spPr>
+          <a:xfrm>
+            <a:off x="14821191" y="23155972"/>
+            <a:ext cx="14630429" cy="9144018"/>
+          </a:xfrm>
+          <a:prstGeom prst="rect">
+            <a:avLst/>
+          </a:prstGeom>
+        </p:spPr>
+      </p:pic>
     </p:spTree>
     <p:extLst>
       <p:ext uri="{BB962C8B-B14F-4D97-AF65-F5344CB8AC3E}">
@@ -3421,4 +4262,594 @@
     </a:ext>
   </a:extLst>
 </a:theme>
+</file>
+
+<file path=ppt/theme/theme2.xml><?xml version="1.0" encoding="utf-8"?>
+<a:theme xmlns:a="http://schemas.openxmlformats.org/drawingml/2006/main" name="Office Theme">
+  <a:themeElements>
+    <a:clrScheme name="Office">
+      <a:dk1>
+        <a:sysClr val="windowText" lastClr="000000"/>
+      </a:dk1>
+      <a:lt1>
+        <a:sysClr val="window" lastClr="FFFFFF"/>
+      </a:lt1>
+      <a:dk2>
+        <a:srgbClr val="44546A"/>
+      </a:dk2>
+      <a:lt2>
+        <a:srgbClr val="E7E6E6"/>
+      </a:lt2>
+      <a:accent1>
+        <a:srgbClr val="4472C4"/>
+      </a:accent1>
+      <a:accent2>
+        <a:srgbClr val="ED7D31"/>
+      </a:accent2>
+      <a:accent3>
+        <a:srgbClr val="A5A5A5"/>
+      </a:accent3>
+      <a:accent4>
+        <a:srgbClr val="FFC000"/>
+      </a:accent4>
+      <a:accent5>
+        <a:srgbClr val="5B9BD5"/>
+      </a:accent5>
+      <a:accent6>
+        <a:srgbClr val="70AD47"/>
+      </a:accent6>
+      <a:hlink>
+        <a:srgbClr val="0563C1"/>
+      </a:hlink>
+      <a:folHlink>
+        <a:srgbClr val="954F72"/>
+      </a:folHlink>
+    </a:clrScheme>
+    <a:fontScheme name="Office">
+      <a:majorFont>
+        <a:latin typeface="Calibri Light" panose="020F0302020204030204"/>
+        <a:ea typeface=""/>
+        <a:cs typeface=""/>
+        <a:font script="Jpan" typeface="游ゴシック Light"/>
+        <a:font script="Hang" typeface="맑은 고딕"/>
+        <a:font script="Hans" typeface="等线 Light"/>
+        <a:font script="Hant" typeface="新細明體"/>
+        <a:font script="Arab" typeface="Times New Roman"/>
+        <a:font script="Hebr" typeface="Times New Roman"/>
+        <a:font script="Thai" typeface="Angsana New"/>
+        <a:font script="Ethi" typeface="Nyala"/>
+        <a:font script="Beng" typeface="Vrinda"/>
+        <a:font script="Gujr" typeface="Shruti"/>
+        <a:font script="Khmr" typeface="MoolBoran"/>
+        <a:font script="Knda" typeface="Tunga"/>
+        <a:font script="Guru" typeface="Raavi"/>
+        <a:font script="Cans" typeface="Euphemia"/>
+        <a:font script="Cher" typeface="Plantagenet Cherokee"/>
+        <a:font script="Yiii" typeface="Microsoft Yi Baiti"/>
+        <a:font script="Tibt" typeface="Microsoft Himalaya"/>
+        <a:font script="Thaa" typeface="MV Boli"/>
+        <a:font script="Deva" typeface="Mangal"/>
+        <a:font script="Telu" typeface="Gautami"/>
+        <a:font script="Taml" typeface="Latha"/>
+        <a:font script="Syrc" typeface="Estrangelo Edessa"/>
+        <a:font script="Orya" typeface="Kalinga"/>
+        <a:font script="Mlym" typeface="Kartika"/>
+        <a:font script="Laoo" typeface="DokChampa"/>
+        <a:font script="Sinh" typeface="Iskoola Pota"/>
+        <a:font script="Mong" typeface="Mongolian Baiti"/>
+        <a:font script="Viet" typeface="Times New Roman"/>
+        <a:font script="Uigh" typeface="Microsoft Uighur"/>
+        <a:font script="Geor" typeface="Sylfaen"/>
+        <a:font script="Armn" typeface="Arial"/>
+        <a:font script="Bugi" typeface="Leelawadee UI"/>
+        <a:font script="Bopo" typeface="Microsoft JhengHei"/>
+        <a:font script="Java" typeface="Javanese Text"/>
+        <a:font script="Lisu" typeface="Segoe UI"/>
+        <a:font script="Mymr" typeface="Myanmar Text"/>
+        <a:font script="Nkoo" typeface="Ebrima"/>
+        <a:font script="Olck" typeface="Nirmala UI"/>
+        <a:font script="Osma" typeface="Ebrima"/>
+        <a:font script="Phag" typeface="Phagspa"/>
+        <a:font script="Syrn" typeface="Estrangelo Edessa"/>
+        <a:font script="Syrj" typeface="Estrangelo Edessa"/>
+        <a:font script="Syre" typeface="Estrangelo Edessa"/>
+        <a:font script="Sora" typeface="Nirmala UI"/>
+        <a:font script="Tale" typeface="Microsoft Tai Le"/>
+        <a:font script="Talu" typeface="Microsoft New Tai Lue"/>
+        <a:font script="Tfng" typeface="Ebrima"/>
+      </a:majorFont>
+      <a:minorFont>
+        <a:latin typeface="Calibri" panose="020F0502020204030204"/>
+        <a:ea typeface=""/>
+        <a:cs typeface=""/>
+        <a:font script="Jpan" typeface="游ゴシック"/>
+        <a:font script="Hang" typeface="맑은 고딕"/>
+        <a:font script="Hans" typeface="等线"/>
+        <a:font script="Hant" typeface="新細明體"/>
+        <a:font script="Arab" typeface="Arial"/>
+        <a:font script="Hebr" typeface="Arial"/>
+        <a:font script="Thai" typeface="Cordia New"/>
+        <a:font script="Ethi" typeface="Nyala"/>
+        <a:font script="Beng" typeface="Vrinda"/>
+        <a:font script="Gujr" typeface="Shruti"/>
+        <a:font script="Khmr" typeface="DaunPenh"/>
+        <a:font script="Knda" typeface="Tunga"/>
+        <a:font script="Guru" typeface="Raavi"/>
+        <a:font script="Cans" typeface="Euphemia"/>
+        <a:font script="Cher" typeface="Plantagenet Cherokee"/>
+        <a:font script="Yiii" typeface="Microsoft Yi Baiti"/>
+        <a:font script="Tibt" typeface="Microsoft Himalaya"/>
+        <a:font script="Thaa" typeface="MV Boli"/>
+        <a:font script="Deva" typeface="Mangal"/>
+        <a:font script="Telu" typeface="Gautami"/>
+        <a:font script="Taml" typeface="Latha"/>
+        <a:font script="Syrc" typeface="Estrangelo Edessa"/>
+        <a:font script="Orya" typeface="Kalinga"/>
+        <a:font script="Mlym" typeface="Kartika"/>
+        <a:font script="Laoo" typeface="DokChampa"/>
+        <a:font script="Sinh" typeface="Iskoola Pota"/>
+        <a:font script="Mong" typeface="Mongolian Baiti"/>
+        <a:font script="Viet" typeface="Arial"/>
+        <a:font script="Uigh" typeface="Microsoft Uighur"/>
+        <a:font script="Geor" typeface="Sylfaen"/>
+        <a:font script="Armn" typeface="Arial"/>
+        <a:font script="Bugi" typeface="Leelawadee UI"/>
+        <a:font script="Bopo" typeface="Microsoft JhengHei"/>
+        <a:font script="Java" typeface="Javanese Text"/>
+        <a:font script="Lisu" typeface="Segoe UI"/>
+        <a:font script="Mymr" typeface="Myanmar Text"/>
+        <a:font script="Nkoo" typeface="Ebrima"/>
+        <a:font script="Olck" typeface="Nirmala UI"/>
+        <a:font script="Osma" typeface="Ebrima"/>
+        <a:font script="Phag" typeface="Phagspa"/>
+        <a:font script="Syrn" typeface="Estrangelo Edessa"/>
+        <a:font script="Syrj" typeface="Estrangelo Edessa"/>
+        <a:font script="Syre" typeface="Estrangelo Edessa"/>
+        <a:font script="Sora" typeface="Nirmala UI"/>
+        <a:font script="Tale" typeface="Microsoft Tai Le"/>
+        <a:font script="Talu" typeface="Microsoft New Tai Lue"/>
+        <a:font script="Tfng" typeface="Ebrima"/>
+      </a:minorFont>
+    </a:fontScheme>
+    <a:fmtScheme name="Office">
+      <a:fillStyleLst>
+        <a:solidFill>
+          <a:schemeClr val="phClr"/>
+        </a:solidFill>
+        <a:gradFill rotWithShape="1">
+          <a:gsLst>
+            <a:gs pos="0">
+              <a:schemeClr val="phClr">
+                <a:lumMod val="110000"/>
+                <a:satMod val="105000"/>
+                <a:tint val="67000"/>
+              </a:schemeClr>
+            </a:gs>
+            <a:gs pos="50000">
+              <a:schemeClr val="phClr">
+                <a:lumMod val="105000"/>
+                <a:satMod val="103000"/>
+                <a:tint val="73000"/>
+              </a:schemeClr>
+            </a:gs>
+            <a:gs pos="100000">
+              <a:schemeClr val="phClr">
+                <a:lumMod val="105000"/>
+                <a:satMod val="109000"/>
+                <a:tint val="81000"/>
+              </a:schemeClr>
+            </a:gs>
+          </a:gsLst>
+          <a:lin ang="5400000" scaled="0"/>
+        </a:gradFill>
+        <a:gradFill rotWithShape="1">
+          <a:gsLst>
+            <a:gs pos="0">
+              <a:schemeClr val="phClr">
+                <a:satMod val="103000"/>
+                <a:lumMod val="102000"/>
+                <a:tint val="94000"/>
+              </a:schemeClr>
+            </a:gs>
+            <a:gs pos="50000">
+              <a:schemeClr val="phClr">
+                <a:satMod val="110000"/>
+                <a:lumMod val="100000"/>
+                <a:shade val="100000"/>
+              </a:schemeClr>
+            </a:gs>
+            <a:gs pos="100000">
+              <a:schemeClr val="phClr">
+                <a:lumMod val="99000"/>
+                <a:satMod val="120000"/>
+                <a:shade val="78000"/>
+              </a:schemeClr>
+            </a:gs>
+          </a:gsLst>
+          <a:lin ang="5400000" scaled="0"/>
+        </a:gradFill>
+      </a:fillStyleLst>
+      <a:lnStyleLst>
+        <a:ln w="6350" cap="flat" cmpd="sng" algn="ctr">
+          <a:solidFill>
+            <a:schemeClr val="phClr"/>
+          </a:solidFill>
+          <a:prstDash val="solid"/>
+          <a:miter lim="800000"/>
+        </a:ln>
+        <a:ln w="12700" cap="flat" cmpd="sng" algn="ctr">
+          <a:solidFill>
+            <a:schemeClr val="phClr"/>
+          </a:solidFill>
+          <a:prstDash val="solid"/>
+          <a:miter lim="800000"/>
+        </a:ln>
+        <a:ln w="19050" cap="flat" cmpd="sng" algn="ctr">
+          <a:solidFill>
+            <a:schemeClr val="phClr"/>
+          </a:solidFill>
+          <a:prstDash val="solid"/>
+          <a:miter lim="800000"/>
+        </a:ln>
+      </a:lnStyleLst>
+      <a:effectStyleLst>
+        <a:effectStyle>
+          <a:effectLst/>
+        </a:effectStyle>
+        <a:effectStyle>
+          <a:effectLst/>
+        </a:effectStyle>
+        <a:effectStyle>
+          <a:effectLst>
+            <a:outerShdw blurRad="57150" dist="19050" dir="5400000" algn="ctr" rotWithShape="0">
+              <a:srgbClr val="000000">
+                <a:alpha val="63000"/>
+              </a:srgbClr>
+            </a:outerShdw>
+          </a:effectLst>
+        </a:effectStyle>
+      </a:effectStyleLst>
+      <a:bgFillStyleLst>
+        <a:solidFill>
+          <a:schemeClr val="phClr"/>
+        </a:solidFill>
+        <a:solidFill>
+          <a:schemeClr val="phClr">
+            <a:tint val="95000"/>
+            <a:satMod val="170000"/>
+          </a:schemeClr>
+        </a:solidFill>
+        <a:gradFill rotWithShape="1">
+          <a:gsLst>
+            <a:gs pos="0">
+              <a:schemeClr val="phClr">
+                <a:tint val="93000"/>
+                <a:satMod val="150000"/>
+                <a:shade val="98000"/>
+                <a:lumMod val="102000"/>
+              </a:schemeClr>
+            </a:gs>
+            <a:gs pos="50000">
+              <a:schemeClr val="phClr">
+                <a:tint val="98000"/>
+                <a:satMod val="130000"/>
+                <a:shade val="90000"/>
+                <a:lumMod val="103000"/>
+              </a:schemeClr>
+            </a:gs>
+            <a:gs pos="100000">
+              <a:schemeClr val="phClr">
+                <a:shade val="63000"/>
+                <a:satMod val="120000"/>
+              </a:schemeClr>
+            </a:gs>
+          </a:gsLst>
+          <a:lin ang="5400000" scaled="0"/>
+        </a:gradFill>
+      </a:bgFillStyleLst>
+    </a:fmtScheme>
+  </a:themeElements>
+  <a:objectDefaults/>
+  <a:extraClrSchemeLst/>
+  <a:extLst>
+    <a:ext uri="{05A4C25C-085E-4340-85A3-A5531E510DB2}">
+      <thm15:themeFamily xmlns:thm15="http://schemas.microsoft.com/office/thememl/2012/main" name="Office Theme" id="{62F939B6-93AF-4DB8-9C6B-D6C7DFDC589F}" vid="{4A3C46E8-61CC-4603-A589-7422A47A8E4A}"/>
+    </a:ext>
+  </a:extLst>
+</a:theme>
+</file>
+
+<file path=ppt/theme/theme3.xml><?xml version="1.0" encoding="utf-8"?>
+<a:theme xmlns:a="http://schemas.openxmlformats.org/drawingml/2006/main" name="Office Theme">
+  <a:themeElements>
+    <a:clrScheme name="Office">
+      <a:dk1>
+        <a:sysClr val="windowText" lastClr="000000"/>
+      </a:dk1>
+      <a:lt1>
+        <a:sysClr val="window" lastClr="FFFFFF"/>
+      </a:lt1>
+      <a:dk2>
+        <a:srgbClr val="44546A"/>
+      </a:dk2>
+      <a:lt2>
+        <a:srgbClr val="E7E6E6"/>
+      </a:lt2>
+      <a:accent1>
+        <a:srgbClr val="4472C4"/>
+      </a:accent1>
+      <a:accent2>
+        <a:srgbClr val="ED7D31"/>
+      </a:accent2>
+      <a:accent3>
+        <a:srgbClr val="A5A5A5"/>
+      </a:accent3>
+      <a:accent4>
+        <a:srgbClr val="FFC000"/>
+      </a:accent4>
+      <a:accent5>
+        <a:srgbClr val="5B9BD5"/>
+      </a:accent5>
+      <a:accent6>
+        <a:srgbClr val="70AD47"/>
+      </a:accent6>
+      <a:hlink>
+        <a:srgbClr val="0563C1"/>
+      </a:hlink>
+      <a:folHlink>
+        <a:srgbClr val="954F72"/>
+      </a:folHlink>
+    </a:clrScheme>
+    <a:fontScheme name="Office">
+      <a:majorFont>
+        <a:latin typeface="Calibri Light" panose="020F0302020204030204"/>
+        <a:ea typeface=""/>
+        <a:cs typeface=""/>
+        <a:font script="Jpan" typeface="游ゴシック Light"/>
+        <a:font script="Hang" typeface="맑은 고딕"/>
+        <a:font script="Hans" typeface="等线 Light"/>
+        <a:font script="Hant" typeface="新細明體"/>
+        <a:font script="Arab" typeface="Times New Roman"/>
+        <a:font script="Hebr" typeface="Times New Roman"/>
+        <a:font script="Thai" typeface="Angsana New"/>
+        <a:font script="Ethi" typeface="Nyala"/>
+        <a:font script="Beng" typeface="Vrinda"/>
+        <a:font script="Gujr" typeface="Shruti"/>
+        <a:font script="Khmr" typeface="MoolBoran"/>
+        <a:font script="Knda" typeface="Tunga"/>
+        <a:font script="Guru" typeface="Raavi"/>
+        <a:font script="Cans" typeface="Euphemia"/>
+        <a:font script="Cher" typeface="Plantagenet Cherokee"/>
+        <a:font script="Yiii" typeface="Microsoft Yi Baiti"/>
+        <a:font script="Tibt" typeface="Microsoft Himalaya"/>
+        <a:font script="Thaa" typeface="MV Boli"/>
+        <a:font script="Deva" typeface="Mangal"/>
+        <a:font script="Telu" typeface="Gautami"/>
+        <a:font script="Taml" typeface="Latha"/>
+        <a:font script="Syrc" typeface="Estrangelo Edessa"/>
+        <a:font script="Orya" typeface="Kalinga"/>
+        <a:font script="Mlym" typeface="Kartika"/>
+        <a:font script="Laoo" typeface="DokChampa"/>
+        <a:font script="Sinh" typeface="Iskoola Pota"/>
+        <a:font script="Mong" typeface="Mongolian Baiti"/>
+        <a:font script="Viet" typeface="Times New Roman"/>
+        <a:font script="Uigh" typeface="Microsoft Uighur"/>
+        <a:font script="Geor" typeface="Sylfaen"/>
+        <a:font script="Armn" typeface="Arial"/>
+        <a:font script="Bugi" typeface="Leelawadee UI"/>
+        <a:font script="Bopo" typeface="Microsoft JhengHei"/>
+        <a:font script="Java" typeface="Javanese Text"/>
+        <a:font script="Lisu" typeface="Segoe UI"/>
+        <a:font script="Mymr" typeface="Myanmar Text"/>
+        <a:font script="Nkoo" typeface="Ebrima"/>
+        <a:font script="Olck" typeface="Nirmala UI"/>
+        <a:font script="Osma" typeface="Ebrima"/>
+        <a:font script="Phag" typeface="Phagspa"/>
+        <a:font script="Syrn" typeface="Estrangelo Edessa"/>
+        <a:font script="Syrj" typeface="Estrangelo Edessa"/>
+        <a:font script="Syre" typeface="Estrangelo Edessa"/>
+        <a:font script="Sora" typeface="Nirmala UI"/>
+        <a:font script="Tale" typeface="Microsoft Tai Le"/>
+        <a:font script="Talu" typeface="Microsoft New Tai Lue"/>
+        <a:font script="Tfng" typeface="Ebrima"/>
+      </a:majorFont>
+      <a:minorFont>
+        <a:latin typeface="Calibri" panose="020F0502020204030204"/>
+        <a:ea typeface=""/>
+        <a:cs typeface=""/>
+        <a:font script="Jpan" typeface="游ゴシック"/>
+        <a:font script="Hang" typeface="맑은 고딕"/>
+        <a:font script="Hans" typeface="等线"/>
+        <a:font script="Hant" typeface="新細明體"/>
+        <a:font script="Arab" typeface="Arial"/>
+        <a:font script="Hebr" typeface="Arial"/>
+        <a:font script="Thai" typeface="Cordia New"/>
+        <a:font script="Ethi" typeface="Nyala"/>
+        <a:font script="Beng" typeface="Vrinda"/>
+        <a:font script="Gujr" typeface="Shruti"/>
+        <a:font script="Khmr" typeface="DaunPenh"/>
+        <a:font script="Knda" typeface="Tunga"/>
+        <a:font script="Guru" typeface="Raavi"/>
+        <a:font script="Cans" typeface="Euphemia"/>
+        <a:font script="Cher" typeface="Plantagenet Cherokee"/>
+        <a:font script="Yiii" typeface="Microsoft Yi Baiti"/>
+        <a:font script="Tibt" typeface="Microsoft Himalaya"/>
+        <a:font script="Thaa" typeface="MV Boli"/>
+        <a:font script="Deva" typeface="Mangal"/>
+        <a:font script="Telu" typeface="Gautami"/>
+        <a:font script="Taml" typeface="Latha"/>
+        <a:font script="Syrc" typeface="Estrangelo Edessa"/>
+        <a:font script="Orya" typeface="Kalinga"/>
+        <a:font script="Mlym" typeface="Kartika"/>
+        <a:font script="Laoo" typeface="DokChampa"/>
+        <a:font script="Sinh" typeface="Iskoola Pota"/>
+        <a:font script="Mong" typeface="Mongolian Baiti"/>
+        <a:font script="Viet" typeface="Arial"/>
+        <a:font script="Uigh" typeface="Microsoft Uighur"/>
+        <a:font script="Geor" typeface="Sylfaen"/>
+        <a:font script="Armn" typeface="Arial"/>
+        <a:font script="Bugi" typeface="Leelawadee UI"/>
+        <a:font script="Bopo" typeface="Microsoft JhengHei"/>
+        <a:font script="Java" typeface="Javanese Text"/>
+        <a:font script="Lisu" typeface="Segoe UI"/>
+        <a:font script="Mymr" typeface="Myanmar Text"/>
+        <a:font script="Nkoo" typeface="Ebrima"/>
+        <a:font script="Olck" typeface="Nirmala UI"/>
+        <a:font script="Osma" typeface="Ebrima"/>
+        <a:font script="Phag" typeface="Phagspa"/>
+        <a:font script="Syrn" typeface="Estrangelo Edessa"/>
+        <a:font script="Syrj" typeface="Estrangelo Edessa"/>
+        <a:font script="Syre" typeface="Estrangelo Edessa"/>
+        <a:font script="Sora" typeface="Nirmala UI"/>
+        <a:font script="Tale" typeface="Microsoft Tai Le"/>
+        <a:font script="Talu" typeface="Microsoft New Tai Lue"/>
+        <a:font script="Tfng" typeface="Ebrima"/>
+      </a:minorFont>
+    </a:fontScheme>
+    <a:fmtScheme name="Office">
+      <a:fillStyleLst>
+        <a:solidFill>
+          <a:schemeClr val="phClr"/>
+        </a:solidFill>
+        <a:gradFill rotWithShape="1">
+          <a:gsLst>
+            <a:gs pos="0">
+              <a:schemeClr val="phClr">
+                <a:lumMod val="110000"/>
+                <a:satMod val="105000"/>
+                <a:tint val="67000"/>
+              </a:schemeClr>
+            </a:gs>
+            <a:gs pos="50000">
+              <a:schemeClr val="phClr">
+                <a:lumMod val="105000"/>
+                <a:satMod val="103000"/>
+                <a:tint val="73000"/>
+              </a:schemeClr>
+            </a:gs>
+            <a:gs pos="100000">
+              <a:schemeClr val="phClr">
+                <a:lumMod val="105000"/>
+                <a:satMod val="109000"/>
+                <a:tint val="81000"/>
+              </a:schemeClr>
+            </a:gs>
+          </a:gsLst>
+          <a:lin ang="5400000" scaled="0"/>
+        </a:gradFill>
+        <a:gradFill rotWithShape="1">
+          <a:gsLst>
+            <a:gs pos="0">
+              <a:schemeClr val="phClr">
+                <a:satMod val="103000"/>
+                <a:lumMod val="102000"/>
+                <a:tint val="94000"/>
+              </a:schemeClr>
+            </a:gs>
+            <a:gs pos="50000">
+              <a:schemeClr val="phClr">
+                <a:satMod val="110000"/>
+                <a:lumMod val="100000"/>
+                <a:shade val="100000"/>
+              </a:schemeClr>
+            </a:gs>
+            <a:gs pos="100000">
+              <a:schemeClr val="phClr">
+                <a:lumMod val="99000"/>
+                <a:satMod val="120000"/>
+                <a:shade val="78000"/>
+              </a:schemeClr>
+            </a:gs>
+          </a:gsLst>
+          <a:lin ang="5400000" scaled="0"/>
+        </a:gradFill>
+      </a:fillStyleLst>
+      <a:lnStyleLst>
+        <a:ln w="6350" cap="flat" cmpd="sng" algn="ctr">
+          <a:solidFill>
+            <a:schemeClr val="phClr"/>
+          </a:solidFill>
+          <a:prstDash val="solid"/>
+          <a:miter lim="800000"/>
+        </a:ln>
+        <a:ln w="12700" cap="flat" cmpd="sng" algn="ctr">
+          <a:solidFill>
+            <a:schemeClr val="phClr"/>
+          </a:solidFill>
+          <a:prstDash val="solid"/>
+          <a:miter lim="800000"/>
+        </a:ln>
+        <a:ln w="19050" cap="flat" cmpd="sng" algn="ctr">
+          <a:solidFill>
+            <a:schemeClr val="phClr"/>
+          </a:solidFill>
+          <a:prstDash val="solid"/>
+          <a:miter lim="800000"/>
+        </a:ln>
+      </a:lnStyleLst>
+      <a:effectStyleLst>
+        <a:effectStyle>
+          <a:effectLst/>
+        </a:effectStyle>
+        <a:effectStyle>
+          <a:effectLst/>
+        </a:effectStyle>
+        <a:effectStyle>
+          <a:effectLst>
+            <a:outerShdw blurRad="57150" dist="19050" dir="5400000" algn="ctr" rotWithShape="0">
+              <a:srgbClr val="000000">
+                <a:alpha val="63000"/>
+              </a:srgbClr>
+            </a:outerShdw>
+          </a:effectLst>
+        </a:effectStyle>
+      </a:effectStyleLst>
+      <a:bgFillStyleLst>
+        <a:solidFill>
+          <a:schemeClr val="phClr"/>
+        </a:solidFill>
+        <a:solidFill>
+          <a:schemeClr val="phClr">
+            <a:tint val="95000"/>
+            <a:satMod val="170000"/>
+          </a:schemeClr>
+        </a:solidFill>
+        <a:gradFill rotWithShape="1">
+          <a:gsLst>
+            <a:gs pos="0">
+              <a:schemeClr val="phClr">
+                <a:tint val="93000"/>
+                <a:satMod val="150000"/>
+                <a:shade val="98000"/>
+                <a:lumMod val="102000"/>
+              </a:schemeClr>
+            </a:gs>
+            <a:gs pos="50000">
+              <a:schemeClr val="phClr">
+                <a:tint val="98000"/>
+                <a:satMod val="130000"/>
+                <a:shade val="90000"/>
+                <a:lumMod val="103000"/>
+              </a:schemeClr>
+            </a:gs>
+            <a:gs pos="100000">
+              <a:schemeClr val="phClr">
+                <a:shade val="63000"/>
+                <a:satMod val="120000"/>
+              </a:schemeClr>
+            </a:gs>
+          </a:gsLst>
+          <a:lin ang="5400000" scaled="0"/>
+        </a:gradFill>
+      </a:bgFillStyleLst>
+    </a:fmtScheme>
+  </a:themeElements>
+  <a:objectDefaults/>
+  <a:extraClrSchemeLst/>
+  <a:extLst>
+    <a:ext uri="{05A4C25C-085E-4340-85A3-A5531E510DB2}">
+      <thm15:themeFamily xmlns:thm15="http://schemas.microsoft.com/office/thememl/2012/main" name="Office Theme" id="{62F939B6-93AF-4DB8-9C6B-D6C7DFDC589F}" vid="{4A3C46E8-61CC-4603-A589-7422A47A8E4A}"/>
+    </a:ext>
+  </a:extLst>
+</a:theme>
 </file>
</xml_diff>

<commit_message>
Postri parandus - SMOTE
</commit_message>
<xml_diff>
--- a/M9_poster.pptx
+++ b/M9_poster.pptx
@@ -223,7 +223,7 @@
           <a:p>
             <a:fld id="{A9C9B128-F4BE-4D7A-AFD9-2AB1AE347F72}" type="datetimeFigureOut">
               <a:rPr lang="en-US" smtClean="0"/>
-              <a:t>12/16/2019</a:t>
+              <a:t>12/19/2019</a:t>
             </a:fld>
             <a:endParaRPr lang="en-US"/>
           </a:p>
@@ -401,7 +401,7 @@
           <a:p>
             <a:fld id="{58D2F95E-5996-4C9B-BC24-BE08262D659D}" type="datetimeFigureOut">
               <a:rPr lang="en-US" smtClean="0"/>
-              <a:t>12/16/2019</a:t>
+              <a:t>12/19/2019</a:t>
             </a:fld>
             <a:endParaRPr lang="en-US"/>
           </a:p>
@@ -800,7 +800,7 @@
           <a:p>
             <a:fld id="{89466727-8F6B-4EB6-8EFC-909E476A2B66}" type="datetimeFigureOut">
               <a:rPr lang="en-US" smtClean="0"/>
-              <a:t>12/16/2019</a:t>
+              <a:t>12/19/2019</a:t>
             </a:fld>
             <a:endParaRPr lang="en-US"/>
           </a:p>
@@ -970,7 +970,7 @@
           <a:p>
             <a:fld id="{89466727-8F6B-4EB6-8EFC-909E476A2B66}" type="datetimeFigureOut">
               <a:rPr lang="en-US" smtClean="0"/>
-              <a:t>12/16/2019</a:t>
+              <a:t>12/19/2019</a:t>
             </a:fld>
             <a:endParaRPr lang="en-US"/>
           </a:p>
@@ -1150,7 +1150,7 @@
           <a:p>
             <a:fld id="{89466727-8F6B-4EB6-8EFC-909E476A2B66}" type="datetimeFigureOut">
               <a:rPr lang="en-US" smtClean="0"/>
-              <a:t>12/16/2019</a:t>
+              <a:t>12/19/2019</a:t>
             </a:fld>
             <a:endParaRPr lang="en-US"/>
           </a:p>
@@ -1320,7 +1320,7 @@
           <a:p>
             <a:fld id="{89466727-8F6B-4EB6-8EFC-909E476A2B66}" type="datetimeFigureOut">
               <a:rPr lang="en-US" smtClean="0"/>
-              <a:t>12/16/2019</a:t>
+              <a:t>12/19/2019</a:t>
             </a:fld>
             <a:endParaRPr lang="en-US"/>
           </a:p>
@@ -1564,7 +1564,7 @@
           <a:p>
             <a:fld id="{89466727-8F6B-4EB6-8EFC-909E476A2B66}" type="datetimeFigureOut">
               <a:rPr lang="en-US" smtClean="0"/>
-              <a:t>12/16/2019</a:t>
+              <a:t>12/19/2019</a:t>
             </a:fld>
             <a:endParaRPr lang="en-US"/>
           </a:p>
@@ -1796,7 +1796,7 @@
           <a:p>
             <a:fld id="{89466727-8F6B-4EB6-8EFC-909E476A2B66}" type="datetimeFigureOut">
               <a:rPr lang="en-US" smtClean="0"/>
-              <a:t>12/16/2019</a:t>
+              <a:t>12/19/2019</a:t>
             </a:fld>
             <a:endParaRPr lang="en-US"/>
           </a:p>
@@ -2163,7 +2163,7 @@
           <a:p>
             <a:fld id="{89466727-8F6B-4EB6-8EFC-909E476A2B66}" type="datetimeFigureOut">
               <a:rPr lang="en-US" smtClean="0"/>
-              <a:t>12/16/2019</a:t>
+              <a:t>12/19/2019</a:t>
             </a:fld>
             <a:endParaRPr lang="en-US"/>
           </a:p>
@@ -2281,7 +2281,7 @@
           <a:p>
             <a:fld id="{89466727-8F6B-4EB6-8EFC-909E476A2B66}" type="datetimeFigureOut">
               <a:rPr lang="en-US" smtClean="0"/>
-              <a:t>12/16/2019</a:t>
+              <a:t>12/19/2019</a:t>
             </a:fld>
             <a:endParaRPr lang="en-US"/>
           </a:p>
@@ -2376,7 +2376,7 @@
           <a:p>
             <a:fld id="{89466727-8F6B-4EB6-8EFC-909E476A2B66}" type="datetimeFigureOut">
               <a:rPr lang="en-US" smtClean="0"/>
-              <a:t>12/16/2019</a:t>
+              <a:t>12/19/2019</a:t>
             </a:fld>
             <a:endParaRPr lang="en-US"/>
           </a:p>
@@ -2653,7 +2653,7 @@
           <a:p>
             <a:fld id="{89466727-8F6B-4EB6-8EFC-909E476A2B66}" type="datetimeFigureOut">
               <a:rPr lang="en-US" smtClean="0"/>
-              <a:t>12/16/2019</a:t>
+              <a:t>12/19/2019</a:t>
             </a:fld>
             <a:endParaRPr lang="en-US"/>
           </a:p>
@@ -2910,7 +2910,7 @@
           <a:p>
             <a:fld id="{89466727-8F6B-4EB6-8EFC-909E476A2B66}" type="datetimeFigureOut">
               <a:rPr lang="en-US" smtClean="0"/>
-              <a:t>12/16/2019</a:t>
+              <a:t>12/19/2019</a:t>
             </a:fld>
             <a:endParaRPr lang="en-US"/>
           </a:p>
@@ -3123,7 +3123,7 @@
           <a:p>
             <a:fld id="{89466727-8F6B-4EB6-8EFC-909E476A2B66}" type="datetimeFigureOut">
               <a:rPr lang="en-US" smtClean="0"/>
-              <a:t>12/16/2019</a:t>
+              <a:t>12/19/2019</a:t>
             </a:fld>
             <a:endParaRPr lang="en-US"/>
           </a:p>
@@ -4159,7 +4159,23 @@
             </a:r>
             <a:r>
               <a:rPr lang="en-US" sz="4000" dirty="0"/>
-              <a:t>exoplanets existence. Below are the confusion matrixes for the random forest model.</a:t>
+              <a:t>exoplanets existence. Below are the confusion </a:t>
+            </a:r>
+            <a:r>
+              <a:rPr lang="en-US" sz="4000" dirty="0" err="1"/>
+              <a:t>matri</a:t>
+            </a:r>
+            <a:r>
+              <a:rPr lang="et-EE" sz="4000" dirty="0"/>
+              <a:t>c</a:t>
+            </a:r>
+            <a:r>
+              <a:rPr lang="en-US" sz="4000"/>
+              <a:t>es </a:t>
+            </a:r>
+            <a:r>
+              <a:rPr lang="en-US" sz="4000" dirty="0"/>
+              <a:t>for the random forest model.</a:t>
             </a:r>
           </a:p>
         </p:txBody>
@@ -4465,7 +4481,7 @@
           <p:nvPr>
             <p:extLst>
               <p:ext uri="{D42A27DB-BD31-4B8C-83A1-F6EECF244321}">
-                <p14:modId xmlns:p14="http://schemas.microsoft.com/office/powerpoint/2010/main" val="960421220"/>
+                <p14:modId xmlns:p14="http://schemas.microsoft.com/office/powerpoint/2010/main" val="3973245413"/>
               </p:ext>
             </p:extLst>
           </p:nvPr>
@@ -4551,7 +4567,7 @@
                       </a:r>
                       <a:r>
                         <a:rPr lang="et-EE" sz="3200" dirty="0" err="1"/>
-                        <a:t>False</a:t>
+                        <a:t>True</a:t>
                       </a:r>
                       <a:endParaRPr lang="en-US" sz="3200" dirty="0"/>
                     </a:p>
@@ -4697,7 +4713,7 @@
           <p:nvPr>
             <p:extLst>
               <p:ext uri="{D42A27DB-BD31-4B8C-83A1-F6EECF244321}">
-                <p14:modId xmlns:p14="http://schemas.microsoft.com/office/powerpoint/2010/main" val="3545992056"/>
+                <p14:modId xmlns:p14="http://schemas.microsoft.com/office/powerpoint/2010/main" val="1527925024"/>
               </p:ext>
             </p:extLst>
           </p:nvPr>
@@ -4783,7 +4799,7 @@
                       </a:r>
                       <a:r>
                         <a:rPr lang="et-EE" sz="3200" dirty="0" err="1"/>
-                        <a:t>False</a:t>
+                        <a:t>True</a:t>
                       </a:r>
                       <a:endParaRPr lang="en-US" sz="3200" dirty="0"/>
                     </a:p>

</xml_diff>